<commit_message>
don't need so many rolls for lab 3
</commit_message>
<xml_diff>
--- a/classes/stats2018/Lab03.pptx
+++ b/classes/stats2018/Lab03.pptx
@@ -3634,7 +3634,7 @@
         <p:spPr>
           <a:xfrm>
             <a:off x="685800" y="609600"/>
-            <a:ext cx="6705600" cy="5355312"/>
+            <a:ext cx="7848600" cy="5078313"/>
           </a:xfrm>
           <a:prstGeom prst="rect">
             <a:avLst/>
@@ -3671,18 +3671,6 @@
             </a:r>
           </a:p>
           <a:p>
-            <a:r>
-              <a:rPr lang="en-US" dirty="0"/>
-              <a:t>4 5 6 6 6 5 6 6 4 6 6 6 6 6 3 5 6 6 2 5 6 5 4 5 2 6 3 6 6 6 6 6 6 1 6 5 6</a:t>
-            </a:r>
-          </a:p>
-          <a:p>
-            <a:r>
-              <a:rPr lang="en-US" dirty="0"/>
-              <a:t>6 6 6 6 2 2 3 6 3 6 6 4 6 1 6 5 2 6 6 5 6 5 4 5 6 6</a:t>
-            </a:r>
-          </a:p>
-          <a:p>
             <a:endParaRPr lang="en-US" dirty="0"/>
           </a:p>
           <a:p>
@@ -3698,6 +3686,21 @@
             <a:r>
               <a:rPr lang="en-US" dirty="0"/>
               <a:t>Show your code…</a:t>
+            </a:r>
+          </a:p>
+          <a:p>
+            <a:endParaRPr lang="en-US" dirty="0"/>
+          </a:p>
+          <a:p>
+            <a:r>
+              <a:rPr lang="en-US" dirty="0"/>
+              <a:t>  You can represent the rolls as</a:t>
+            </a:r>
+          </a:p>
+          <a:p>
+            <a:r>
+              <a:rPr lang="en-US" dirty="0"/>
+              <a:t>data&lt;-c(2,3,2,6,3,5,6,2,6,6,2,6,6,2,3,6,6,6,5,6,6,5,6,6,6,6,6,4,6,3,3,3,6,6,5,6,6)</a:t>
             </a:r>
           </a:p>
           <a:p>

</xml_diff>